<commit_message>
Typo corrections and minor changes are made in the PTM slides.
git-svn-id: http://dminfo:8686/svn/repository/models/branches/dsm2_distribute_v8_0@1610 cdc4813b-4270-ec4f-936e-925f93a782c2

Former-commit-id: c176362f5e04abba1a424de7edad85d437c87746
</commit_message>
<xml_diff>
--- a/dsm2/presentations/d2_ptm.pptx
+++ b/dsm2/presentations/d2_ptm.pptx
@@ -236,7 +236,7 @@
           </a:lstStyle>
           <a:p>
             <a:r>
-              <a:rPr lang="en-US"/>
+              <a:rPr lang="en-US" dirty="0"/>
               <a:t>DSM2 Users Group: "EXAMPLE: Filling in Martinez Stage"</a:t>
             </a:r>
           </a:p>
@@ -284,7 +284,7 @@
           </a:lstStyle>
           <a:p>
             <a:r>
-              <a:rPr lang="en-US"/>
+              <a:rPr lang="en-US" dirty="0"/>
               <a:t>2004.04.27</a:t>
             </a:r>
           </a:p>
@@ -331,7 +331,7 @@
             </a:lvl1pPr>
           </a:lstStyle>
           <a:p>
-            <a:endParaRPr lang="en-US"/>
+            <a:endParaRPr lang="en-US" dirty="0"/>
           </a:p>
         </p:txBody>
       </p:sp>
@@ -381,7 +381,7 @@
               <a:pPr/>
               <a:t>‹#›</a:t>
             </a:fld>
-            <a:endParaRPr lang="en-US"/>
+            <a:endParaRPr lang="en-US" dirty="0"/>
           </a:p>
         </p:txBody>
       </p:sp>
@@ -458,7 +458,7 @@
           </a:lstStyle>
           <a:p>
             <a:r>
-              <a:rPr lang="en-US"/>
+              <a:rPr lang="en-US" dirty="0"/>
               <a:t>DSM2 Users Group: "EXAMPLE: Filling in Martinez Stage"</a:t>
             </a:r>
           </a:p>
@@ -506,7 +506,7 @@
           </a:lstStyle>
           <a:p>
             <a:r>
-              <a:rPr lang="en-US"/>
+              <a:rPr lang="en-US" dirty="0"/>
               <a:t>2004.04.27</a:t>
             </a:r>
           </a:p>
@@ -654,7 +654,7 @@
             </a:lvl1pPr>
           </a:lstStyle>
           <a:p>
-            <a:endParaRPr lang="en-US"/>
+            <a:endParaRPr lang="en-US" dirty="0"/>
           </a:p>
         </p:txBody>
       </p:sp>
@@ -704,7 +704,7 @@
               <a:pPr/>
               <a:t>‹#›</a:t>
             </a:fld>
-            <a:endParaRPr lang="en-US"/>
+            <a:endParaRPr lang="en-US" dirty="0"/>
           </a:p>
         </p:txBody>
       </p:sp>
@@ -872,7 +872,7 @@
           <a:lstStyle/>
           <a:p>
             <a:r>
-              <a:rPr lang="en-US"/>
+              <a:rPr lang="en-US" dirty="0"/>
               <a:t>DSM2 Users Group: "EXAMPLE: Filling in Martinez Stage"</a:t>
             </a:r>
           </a:p>
@@ -896,7 +896,7 @@
           <a:lstStyle/>
           <a:p>
             <a:r>
-              <a:rPr lang="en-US"/>
+              <a:rPr lang="en-US" dirty="0"/>
               <a:t>2004.04.27</a:t>
             </a:r>
           </a:p>
@@ -924,7 +924,7 @@
               <a:pPr/>
               <a:t>1</a:t>
             </a:fld>
-            <a:endParaRPr lang="en-US"/>
+            <a:endParaRPr lang="en-US" dirty="0"/>
           </a:p>
         </p:txBody>
       </p:sp>
@@ -958,7 +958,7 @@
           <a:lstStyle/>
           <a:p>
             <a:pPr marL="228600" indent="-228600"/>
-            <a:endParaRPr lang="en-US"/>
+            <a:endParaRPr lang="en-US" dirty="0"/>
           </a:p>
         </p:txBody>
       </p:sp>
@@ -1036,10 +1036,10 @@
           <a:lstStyle/>
           <a:p>
             <a:r>
-              <a:rPr lang="en-US" smtClean="0"/>
+              <a:rPr lang="en-US" dirty="0" smtClean="0"/>
               <a:t>DSM2 Users Group: "EXAMPLE: Filling in Martinez Stage"</a:t>
             </a:r>
-            <a:endParaRPr lang="en-US"/>
+            <a:endParaRPr lang="en-US" dirty="0"/>
           </a:p>
         </p:txBody>
       </p:sp>
@@ -1059,10 +1059,10 @@
           <a:lstStyle/>
           <a:p>
             <a:r>
-              <a:rPr lang="en-US" smtClean="0"/>
+              <a:rPr lang="en-US" dirty="0" smtClean="0"/>
               <a:t>2004.04.27</a:t>
             </a:r>
-            <a:endParaRPr lang="en-US"/>
+            <a:endParaRPr lang="en-US" dirty="0"/>
           </a:p>
         </p:txBody>
       </p:sp>
@@ -1086,7 +1086,7 @@
               <a:pPr/>
               <a:t>3</a:t>
             </a:fld>
-            <a:endParaRPr lang="en-US"/>
+            <a:endParaRPr lang="en-US" dirty="0"/>
           </a:p>
         </p:txBody>
       </p:sp>
@@ -1232,7 +1232,7 @@
               <a:pPr/>
               <a:t>‹#›</a:t>
             </a:fld>
-            <a:endParaRPr lang="en-US"/>
+            <a:endParaRPr lang="en-US" dirty="0"/>
           </a:p>
         </p:txBody>
       </p:sp>
@@ -1361,7 +1361,7 @@
               <a:pPr/>
               <a:t>‹#›</a:t>
             </a:fld>
-            <a:endParaRPr lang="en-US"/>
+            <a:endParaRPr lang="en-US" dirty="0"/>
           </a:p>
         </p:txBody>
       </p:sp>
@@ -1500,7 +1500,7 @@
               <a:pPr/>
               <a:t>‹#›</a:t>
             </a:fld>
-            <a:endParaRPr lang="en-US"/>
+            <a:endParaRPr lang="en-US" dirty="0"/>
           </a:p>
         </p:txBody>
       </p:sp>
@@ -1629,7 +1629,7 @@
               <a:pPr/>
               <a:t>‹#›</a:t>
             </a:fld>
-            <a:endParaRPr lang="en-US"/>
+            <a:endParaRPr lang="en-US" dirty="0"/>
           </a:p>
         </p:txBody>
       </p:sp>
@@ -1780,7 +1780,7 @@
               <a:pPr/>
               <a:t>‹#›</a:t>
             </a:fld>
-            <a:endParaRPr lang="en-US"/>
+            <a:endParaRPr lang="en-US" dirty="0"/>
           </a:p>
         </p:txBody>
       </p:sp>
@@ -2027,7 +2027,7 @@
               <a:pPr/>
               <a:t>‹#›</a:t>
             </a:fld>
-            <a:endParaRPr lang="en-US"/>
+            <a:endParaRPr lang="en-US" dirty="0"/>
           </a:p>
         </p:txBody>
       </p:sp>
@@ -2413,7 +2413,7 @@
               <a:pPr/>
               <a:t>‹#›</a:t>
             </a:fld>
-            <a:endParaRPr lang="en-US"/>
+            <a:endParaRPr lang="en-US" dirty="0"/>
           </a:p>
         </p:txBody>
       </p:sp>
@@ -2490,7 +2490,7 @@
               <a:pPr/>
               <a:t>‹#›</a:t>
             </a:fld>
-            <a:endParaRPr lang="en-US"/>
+            <a:endParaRPr lang="en-US" dirty="0"/>
           </a:p>
         </p:txBody>
       </p:sp>
@@ -2544,7 +2544,7 @@
               <a:pPr/>
               <a:t>‹#›</a:t>
             </a:fld>
-            <a:endParaRPr lang="en-US"/>
+            <a:endParaRPr lang="en-US" dirty="0"/>
           </a:p>
         </p:txBody>
       </p:sp>
@@ -2780,7 +2780,7 @@
               <a:pPr/>
               <a:t>‹#›</a:t>
             </a:fld>
-            <a:endParaRPr lang="en-US"/>
+            <a:endParaRPr lang="en-US" dirty="0"/>
           </a:p>
         </p:txBody>
       </p:sp>
@@ -2899,7 +2899,7 @@
             </a:lvl9pPr>
           </a:lstStyle>
           <a:p>
-            <a:endParaRPr lang="en-US"/>
+            <a:endParaRPr lang="en-US" dirty="0"/>
           </a:p>
         </p:txBody>
       </p:sp>
@@ -2992,7 +2992,7 @@
               <a:pPr/>
               <a:t>‹#›</a:t>
             </a:fld>
-            <a:endParaRPr lang="en-US"/>
+            <a:endParaRPr lang="en-US" dirty="0"/>
           </a:p>
         </p:txBody>
       </p:sp>
@@ -3200,7 +3200,7 @@
               <a:pPr/>
               <a:t>‹#›</a:t>
             </a:fld>
-            <a:endParaRPr lang="en-US"/>
+            <a:endParaRPr lang="en-US" dirty="0"/>
           </a:p>
         </p:txBody>
       </p:sp>
@@ -3668,7 +3668,15 @@
           <a:p>
             <a:r>
               <a:rPr lang="en-US" dirty="0" smtClean="0"/>
-              <a:t>September 15-17, 2009</a:t>
+              <a:t>September </a:t>
+            </a:r>
+            <a:r>
+              <a:rPr lang="en-US" dirty="0" smtClean="0"/>
+              <a:t>21,22, and 24, </a:t>
+            </a:r>
+            <a:r>
+              <a:rPr lang="en-US" dirty="0" smtClean="0"/>
+              <a:t>2009</a:t>
             </a:r>
             <a:endParaRPr lang="en-US" dirty="0"/>
           </a:p>
@@ -3814,8 +3822,8 @@
           <a:lstStyle/>
           <a:p>
             <a:r>
-              <a:rPr lang="en-US" dirty="0" err="1" smtClean="0"/>
-              <a:t>Gotchas</a:t>
+              <a:rPr lang="en-US" dirty="0" smtClean="0"/>
+              <a:t>Gotha's</a:t>
             </a:r>
             <a:endParaRPr lang="en-US" dirty="0"/>
           </a:p>
@@ -3837,47 +3845,40 @@
           <a:lstStyle/>
           <a:p>
             <a:r>
-              <a:rPr lang="en-US" sz="2400" dirty="0" smtClean="0"/>
+              <a:rPr lang="en-US" sz="2500" dirty="0" smtClean="0"/>
               <a:t>Release particles at least a few days later after the start time of hydrodynamics.</a:t>
             </a:r>
           </a:p>
           <a:p>
             <a:r>
-              <a:rPr lang="en-US" sz="2400" dirty="0" smtClean="0"/>
+              <a:rPr lang="en-US" sz="2500" dirty="0" smtClean="0"/>
               <a:t>Do not use a group name ‘all’ to define a new group.  It is a reserved already.</a:t>
             </a:r>
           </a:p>
           <a:p>
             <a:r>
-              <a:rPr lang="en-US" sz="2400" dirty="0" smtClean="0"/>
+              <a:rPr lang="en-US" sz="2500" dirty="0" smtClean="0"/>
               <a:t>Limitations in the numbers of groups and outputs.</a:t>
             </a:r>
           </a:p>
           <a:p>
             <a:r>
-              <a:rPr lang="en-US" sz="2400" dirty="0" smtClean="0"/>
+              <a:rPr lang="en-US" sz="2500" dirty="0" smtClean="0"/>
               <a:t>Wrong group names in fluxes and group output lines</a:t>
             </a:r>
           </a:p>
           <a:p>
             <a:r>
-              <a:rPr lang="en-US" sz="2400" dirty="0" smtClean="0"/>
-              <a:t>Too many particles may crash a simulation.</a:t>
-            </a:r>
-          </a:p>
-          <a:p>
-            <a:pPr lvl="1"/>
-            <a:r>
-              <a:rPr lang="en-US" sz="2000" dirty="0" smtClean="0"/>
-              <a:t>Increase the memory of the Java virtual machine.</a:t>
-            </a:r>
-          </a:p>
-          <a:p>
-            <a:r>
-              <a:rPr lang="en-US" sz="2400" dirty="0" smtClean="0"/>
+              <a:rPr lang="en-US" sz="2500" dirty="0" smtClean="0"/>
+              <a:t>Too many particles may cause a simulation crash.</a:t>
+            </a:r>
+          </a:p>
+          <a:p>
+            <a:r>
+              <a:rPr lang="en-US" sz="2500" dirty="0" smtClean="0"/>
               <a:t>Turn off animation output to save running time.</a:t>
             </a:r>
-            <a:endParaRPr lang="en-US" sz="2400" dirty="0"/>
+            <a:endParaRPr lang="en-US" sz="2500" dirty="0"/>
           </a:p>
         </p:txBody>
       </p:sp>
@@ -3901,7 +3902,7 @@
               <a:pPr/>
               <a:t>10</a:t>
             </a:fld>
-            <a:endParaRPr lang="en-US"/>
+            <a:endParaRPr lang="en-US" dirty="0"/>
           </a:p>
         </p:txBody>
       </p:sp>
@@ -3984,12 +3985,8 @@
           <a:p>
             <a:pPr lvl="1"/>
             <a:r>
-              <a:rPr lang="en-US" dirty="0" err="1" smtClean="0"/>
-              <a:t>Wanger</a:t>
-            </a:r>
-            <a:r>
               <a:rPr lang="en-US" dirty="0" smtClean="0"/>
-              <a:t> decision</a:t>
+              <a:t>Wanger decision</a:t>
             </a:r>
           </a:p>
           <a:p>
@@ -4051,7 +4048,7 @@
               <a:pPr/>
               <a:t>11</a:t>
             </a:fld>
-            <a:endParaRPr lang="en-US"/>
+            <a:endParaRPr lang="en-US" dirty="0"/>
           </a:p>
         </p:txBody>
       </p:sp>
@@ -4195,7 +4192,7 @@
               <a:pPr/>
               <a:t>12</a:t>
             </a:fld>
-            <a:endParaRPr lang="en-US"/>
+            <a:endParaRPr lang="en-US" dirty="0"/>
           </a:p>
         </p:txBody>
       </p:sp>
@@ -4278,29 +4275,21 @@
           <a:p>
             <a:r>
               <a:rPr lang="en-US" dirty="0" smtClean="0"/>
-              <a:t>Particles are injected at </a:t>
-            </a:r>
-            <a:r>
-              <a:rPr lang="en-US" dirty="0" err="1" smtClean="0"/>
-              <a:t>Mossdale</a:t>
-            </a:r>
+              <a:t>Particles are injected at Mossdale (Node 7) continuously.</a:t>
+            </a:r>
+          </a:p>
+          <a:p>
             <a:r>
               <a:rPr lang="en-US" dirty="0" smtClean="0"/>
-              <a:t> (Node 7) </a:t>
-            </a:r>
-            <a:r>
-              <a:rPr lang="en-US" dirty="0" err="1" smtClean="0"/>
-              <a:t>continously</a:t>
+              <a:t>Outputs are in-delta particles and accumulated </a:t>
+            </a:r>
+            <a:r>
+              <a:rPr lang="en-US" smtClean="0"/>
+              <a:t>particle fluxes </a:t>
             </a:r>
             <a:r>
               <a:rPr lang="en-US" dirty="0" smtClean="0"/>
-              <a:t>.</a:t>
-            </a:r>
-          </a:p>
-          <a:p>
-            <a:r>
-              <a:rPr lang="en-US" dirty="0" smtClean="0"/>
-              <a:t>Outputs are in-delta particles and accumulated particles at the exports and Martinez downstream boundary.</a:t>
+              <a:t>at the exports and Martinez downstream boundary.</a:t>
             </a:r>
             <a:endParaRPr lang="en-US" dirty="0"/>
           </a:p>
@@ -4326,7 +4315,7 @@
               <a:pPr/>
               <a:t>13</a:t>
             </a:fld>
-            <a:endParaRPr lang="en-US"/>
+            <a:endParaRPr lang="en-US" dirty="0"/>
           </a:p>
         </p:txBody>
       </p:sp>
@@ -4421,7 +4410,7 @@
               <a:pPr/>
               <a:t>14</a:t>
             </a:fld>
-            <a:endParaRPr lang="en-US"/>
+            <a:endParaRPr lang="en-US" dirty="0"/>
           </a:p>
         </p:txBody>
       </p:sp>
@@ -4548,7 +4537,7 @@
               <a:buNone/>
               <a:tabLst/>
             </a:pPr>
-            <a:endParaRPr kumimoji="0" lang="en-US" sz="3600" b="1" i="0" u="none" strike="noStrike" cap="none" normalizeH="0" baseline="0" smtClean="0">
+            <a:endParaRPr kumimoji="0" lang="en-US" sz="3600" b="1" i="0" u="none" strike="noStrike" cap="none" normalizeH="0" baseline="0" dirty="0" smtClean="0">
               <a:ln>
                 <a:noFill/>
               </a:ln>
@@ -4593,11 +4582,6 @@
               </a:rPr>
               <a:t>Particle</a:t>
             </a:r>
-            <a:endParaRPr lang="en-US" sz="1800" dirty="0" smtClean="0">
-              <a:solidFill>
-                <a:schemeClr val="bg2"/>
-              </a:solidFill>
-            </a:endParaRPr>
           </a:p>
           <a:p>
             <a:r>
@@ -4611,7 +4595,7 @@
           </a:p>
           <a:p>
             <a:r>
-              <a:rPr lang="en-US" sz="1800" dirty="0" err="1" smtClean="0">
+              <a:rPr lang="en-US" sz="1800" dirty="0" smtClean="0">
                 <a:solidFill>
                   <a:schemeClr val="bg2"/>
                 </a:solidFill>
@@ -4676,7 +4660,7 @@
               <a:buNone/>
               <a:tabLst/>
             </a:pPr>
-            <a:endParaRPr kumimoji="0" lang="en-US" sz="3600" b="1" i="0" u="none" strike="noStrike" cap="none" normalizeH="0" baseline="0" smtClean="0">
+            <a:endParaRPr kumimoji="0" lang="en-US" sz="3600" b="1" i="0" u="none" strike="noStrike" cap="none" normalizeH="0" baseline="0" dirty="0" smtClean="0">
               <a:ln>
                 <a:noFill/>
               </a:ln>
@@ -4721,11 +4705,6 @@
               </a:rPr>
               <a:t>Flux:</a:t>
             </a:r>
-            <a:endParaRPr lang="en-US" sz="1800" dirty="0" smtClean="0">
-              <a:solidFill>
-                <a:schemeClr val="bg2"/>
-              </a:solidFill>
-            </a:endParaRPr>
           </a:p>
           <a:p>
             <a:r>
@@ -4774,23 +4753,7 @@
                   <a:schemeClr val="bg2"/>
                 </a:solidFill>
               </a:rPr>
-              <a:t>Flux: SWP </a:t>
-            </a:r>
-            <a:r>
-              <a:rPr lang="en-US" sz="1800" dirty="0" smtClean="0">
-                <a:solidFill>
-                  <a:schemeClr val="bg2"/>
-                </a:solidFill>
-              </a:rPr>
-              <a:t>&amp; </a:t>
-            </a:r>
-            <a:r>
-              <a:rPr lang="en-US" sz="1800" dirty="0" smtClean="0">
-                <a:solidFill>
-                  <a:schemeClr val="bg2"/>
-                </a:solidFill>
-              </a:rPr>
-              <a:t>CVP</a:t>
+              <a:t>Flux: SWP &amp; CVP</a:t>
             </a:r>
             <a:endParaRPr lang="en-US" sz="1800" dirty="0">
               <a:solidFill>
@@ -4895,7 +4858,7 @@
               <a:buNone/>
               <a:tabLst/>
             </a:pPr>
-            <a:endParaRPr kumimoji="0" lang="en-US" sz="3600" b="1" i="0" u="none" strike="noStrike" cap="none" normalizeH="0" baseline="0" smtClean="0">
+            <a:endParaRPr kumimoji="0" lang="en-US" sz="3600" b="1" i="0" u="none" strike="noStrike" cap="none" normalizeH="0" baseline="0" dirty="0" smtClean="0">
               <a:ln>
                 <a:noFill/>
               </a:ln>
@@ -4938,25 +4901,12 @@
                   <a:schemeClr val="bg2"/>
                 </a:solidFill>
               </a:rPr>
-              <a:t>Flux</a:t>
-            </a:r>
+              <a:t>Flux:</a:t>
+            </a:r>
+          </a:p>
+          <a:p>
             <a:r>
               <a:rPr lang="en-US" sz="1800" dirty="0" smtClean="0">
-                <a:solidFill>
-                  <a:schemeClr val="bg2"/>
-                </a:solidFill>
-              </a:rPr>
-              <a:t>:</a:t>
-            </a:r>
-            <a:endParaRPr lang="en-US" sz="1800" dirty="0" smtClean="0">
-              <a:solidFill>
-                <a:schemeClr val="bg2"/>
-              </a:solidFill>
-            </a:endParaRPr>
-          </a:p>
-          <a:p>
-            <a:r>
-              <a:rPr lang="en-US" sz="1800" dirty="0" err="1" smtClean="0">
                 <a:solidFill>
                   <a:schemeClr val="bg2"/>
                 </a:solidFill>
@@ -5021,7 +4971,7 @@
               <a:buNone/>
               <a:tabLst/>
             </a:pPr>
-            <a:endParaRPr kumimoji="0" lang="en-US" sz="3600" b="1" i="0" u="none" strike="noStrike" cap="none" normalizeH="0" baseline="0" smtClean="0">
+            <a:endParaRPr kumimoji="0" lang="en-US" sz="3600" b="1" i="0" u="none" strike="noStrike" cap="none" normalizeH="0" baseline="0" dirty="0" smtClean="0">
               <a:ln>
                 <a:noFill/>
               </a:ln>
@@ -5076,11 +5026,6 @@
               </a:rPr>
               <a:t>Franks</a:t>
             </a:r>
-            <a:endParaRPr lang="en-US" sz="1800" dirty="0" smtClean="0">
-              <a:solidFill>
-                <a:schemeClr val="bg2"/>
-              </a:solidFill>
-            </a:endParaRPr>
           </a:p>
         </p:txBody>
       </p:sp>
@@ -5134,7 +5079,7 @@
               <a:buNone/>
               <a:tabLst/>
             </a:pPr>
-            <a:endParaRPr kumimoji="0" lang="en-US" sz="3600" b="1" i="0" u="none" strike="noStrike" cap="none" normalizeH="0" baseline="0" smtClean="0">
+            <a:endParaRPr kumimoji="0" lang="en-US" sz="3600" b="1" i="0" u="none" strike="noStrike" cap="none" normalizeH="0" baseline="0" dirty="0" smtClean="0">
               <a:ln>
                 <a:noFill/>
               </a:ln>
@@ -5197,7 +5142,7 @@
               <a:buNone/>
               <a:tabLst/>
             </a:pPr>
-            <a:endParaRPr kumimoji="0" lang="en-US" sz="3600" b="1" i="0" u="none" strike="noStrike" cap="none" normalizeH="0" baseline="0" smtClean="0">
+            <a:endParaRPr kumimoji="0" lang="en-US" sz="3600" b="1" i="0" u="none" strike="noStrike" cap="none" normalizeH="0" baseline="0" dirty="0" smtClean="0">
               <a:ln>
                 <a:noFill/>
               </a:ln>
@@ -5262,7 +5207,7 @@
               <a:buNone/>
               <a:tabLst/>
             </a:pPr>
-            <a:endParaRPr kumimoji="0" lang="en-US" sz="3600" b="1" i="0" u="none" strike="noStrike" cap="none" normalizeH="0" baseline="0" smtClean="0">
+            <a:endParaRPr kumimoji="0" lang="en-US" sz="3600" b="1" i="0" u="none" strike="noStrike" cap="none" normalizeH="0" baseline="0" dirty="0" smtClean="0">
               <a:ln>
                 <a:noFill/>
               </a:ln>
@@ -5370,7 +5315,7 @@
               <a:pPr/>
               <a:t>15</a:t>
             </a:fld>
-            <a:endParaRPr lang="en-US"/>
+            <a:endParaRPr lang="en-US" dirty="0"/>
           </a:p>
         </p:txBody>
       </p:sp>
@@ -5529,7 +5474,7 @@
               <a:pPr/>
               <a:t>16</a:t>
             </a:fld>
-            <a:endParaRPr lang="en-US"/>
+            <a:endParaRPr lang="en-US" dirty="0"/>
           </a:p>
         </p:txBody>
       </p:sp>
@@ -5641,7 +5586,7 @@
               <a:pPr/>
               <a:t>17</a:t>
             </a:fld>
-            <a:endParaRPr lang="en-US"/>
+            <a:endParaRPr lang="en-US" dirty="0"/>
           </a:p>
         </p:txBody>
       </p:sp>
@@ -5747,7 +5692,7 @@
               <a:pPr/>
               <a:t>18</a:t>
             </a:fld>
-            <a:endParaRPr lang="en-US"/>
+            <a:endParaRPr lang="en-US" dirty="0"/>
           </a:p>
         </p:txBody>
       </p:sp>
@@ -5848,7 +5793,7 @@
           <a:bodyPr/>
           <a:lstStyle/>
           <a:p>
-            <a:endParaRPr lang="en-US"/>
+            <a:endParaRPr lang="en-US" dirty="0"/>
           </a:p>
         </p:txBody>
       </p:sp>
@@ -5872,7 +5817,7 @@
               <a:pPr/>
               <a:t>19</a:t>
             </a:fld>
-            <a:endParaRPr lang="en-US"/>
+            <a:endParaRPr lang="en-US" dirty="0"/>
           </a:p>
         </p:txBody>
       </p:sp>
@@ -5984,15 +5929,7 @@
           <a:p>
             <a:r>
               <a:rPr lang="en-US" dirty="0" smtClean="0"/>
-              <a:t>Tracking </a:t>
-            </a:r>
-            <a:r>
-              <a:rPr lang="en-US" smtClean="0"/>
-              <a:t>discrete matter </a:t>
-            </a:r>
-            <a:r>
-              <a:rPr lang="en-US" dirty="0" smtClean="0"/>
-              <a:t>in fluid</a:t>
+              <a:t>Tracking discrete matter in fluid</a:t>
             </a:r>
           </a:p>
           <a:p>
@@ -6001,6 +5938,10 @@
               <a:rPr lang="en-US" dirty="0" smtClean="0"/>
               <a:t>Possibility of adding behaviors</a:t>
             </a:r>
+          </a:p>
+          <a:p>
+            <a:pPr marL="742950" lvl="2" indent="-342900"/>
+            <a:endParaRPr lang="en-US" dirty="0" smtClean="0"/>
           </a:p>
           <a:p>
             <a:pPr marL="342900" lvl="1" indent="-342900">
@@ -6023,7 +5964,7 @@
             <a:pPr marL="742950" lvl="2" indent="-342900"/>
             <a:r>
               <a:rPr lang="en-US" dirty="0" smtClean="0"/>
-              <a:t>Not suffered from numerical oscillation problems</a:t>
+              <a:t>Not suffers from numerical oscillation problems</a:t>
             </a:r>
           </a:p>
         </p:txBody>
@@ -6048,7 +5989,7 @@
               <a:pPr/>
               <a:t>2</a:t>
             </a:fld>
-            <a:endParaRPr lang="en-US"/>
+            <a:endParaRPr lang="en-US" dirty="0"/>
           </a:p>
         </p:txBody>
       </p:sp>
@@ -6123,7 +6064,7 @@
           <a:bodyPr/>
           <a:lstStyle/>
           <a:p>
-            <a:endParaRPr lang="en-US"/>
+            <a:endParaRPr lang="en-US" dirty="0"/>
           </a:p>
         </p:txBody>
       </p:sp>
@@ -6147,7 +6088,7 @@
               <a:pPr/>
               <a:t>20</a:t>
             </a:fld>
-            <a:endParaRPr lang="en-US"/>
+            <a:endParaRPr lang="en-US" dirty="0"/>
           </a:p>
         </p:txBody>
       </p:sp>
@@ -6257,7 +6198,7 @@
           <a:bodyPr/>
           <a:lstStyle/>
           <a:p>
-            <a:endParaRPr lang="en-US"/>
+            <a:endParaRPr lang="en-US" dirty="0"/>
           </a:p>
         </p:txBody>
       </p:sp>
@@ -6281,7 +6222,7 @@
               <a:pPr/>
               <a:t>21</a:t>
             </a:fld>
-            <a:endParaRPr lang="en-US"/>
+            <a:endParaRPr lang="en-US" dirty="0"/>
           </a:p>
         </p:txBody>
       </p:sp>
@@ -6320,7 +6261,7 @@
           <a:bodyPr wrap="none" anchor="ctr"/>
           <a:lstStyle/>
           <a:p>
-            <a:endParaRPr lang="en-US"/>
+            <a:endParaRPr lang="en-US" dirty="0"/>
           </a:p>
         </p:txBody>
       </p:sp>
@@ -6355,7 +6296,7 @@
           <a:bodyPr anchor="ctr"/>
           <a:lstStyle/>
           <a:p>
-            <a:endParaRPr lang="en-US"/>
+            <a:endParaRPr lang="en-US" dirty="0"/>
           </a:p>
         </p:txBody>
       </p:sp>
@@ -6416,7 +6357,7 @@
           <a:bodyPr anchor="ctr"/>
           <a:lstStyle/>
           <a:p>
-            <a:endParaRPr lang="en-US"/>
+            <a:endParaRPr lang="en-US" dirty="0"/>
           </a:p>
         </p:txBody>
       </p:sp>
@@ -6451,7 +6392,7 @@
           <a:bodyPr anchor="ctr"/>
           <a:lstStyle/>
           <a:p>
-            <a:endParaRPr lang="en-US"/>
+            <a:endParaRPr lang="en-US" dirty="0"/>
           </a:p>
         </p:txBody>
       </p:sp>
@@ -6486,7 +6427,7 @@
           <a:bodyPr anchor="ctr"/>
           <a:lstStyle/>
           <a:p>
-            <a:endParaRPr lang="en-US"/>
+            <a:endParaRPr lang="en-US" dirty="0"/>
           </a:p>
         </p:txBody>
       </p:sp>
@@ -6521,7 +6462,7 @@
           <a:bodyPr anchor="ctr"/>
           <a:lstStyle/>
           <a:p>
-            <a:endParaRPr lang="en-US"/>
+            <a:endParaRPr lang="en-US" dirty="0"/>
           </a:p>
         </p:txBody>
       </p:sp>
@@ -6556,7 +6497,7 @@
           <a:bodyPr anchor="ctr"/>
           <a:lstStyle/>
           <a:p>
-            <a:endParaRPr lang="en-US"/>
+            <a:endParaRPr lang="en-US" dirty="0"/>
           </a:p>
         </p:txBody>
       </p:sp>
@@ -6591,7 +6532,7 @@
           <a:bodyPr anchor="ctr"/>
           <a:lstStyle/>
           <a:p>
-            <a:endParaRPr lang="en-US"/>
+            <a:endParaRPr lang="en-US" dirty="0"/>
           </a:p>
         </p:txBody>
       </p:sp>
@@ -6706,7 +6647,7 @@
               <a:pPr/>
               <a:t>22</a:t>
             </a:fld>
-            <a:endParaRPr lang="en-US"/>
+            <a:endParaRPr lang="en-US" dirty="0"/>
           </a:p>
         </p:txBody>
       </p:sp>
@@ -6821,7 +6762,7 @@
               <a:pPr/>
               <a:t>23</a:t>
             </a:fld>
-            <a:endParaRPr lang="en-US"/>
+            <a:endParaRPr lang="en-US" dirty="0"/>
           </a:p>
         </p:txBody>
       </p:sp>
@@ -6904,15 +6845,7 @@
           <a:p>
             <a:r>
               <a:rPr lang="en-US" dirty="0" smtClean="0"/>
-              <a:t>When a particle hits a node, a next </a:t>
-            </a:r>
-            <a:r>
-              <a:rPr lang="en-US" dirty="0" err="1" smtClean="0"/>
-              <a:t>waterbody</a:t>
-            </a:r>
-            <a:r>
-              <a:rPr lang="en-US" dirty="0" smtClean="0"/>
-              <a:t> is determined only by the ratio of the outflows at the node.</a:t>
+              <a:t>When a particle hits a node, a next waterbody is determined only by the ratio of the outflows at the node.</a:t>
             </a:r>
           </a:p>
           <a:p>
@@ -6945,7 +6878,7 @@
               <a:pPr/>
               <a:t>24</a:t>
             </a:fld>
-            <a:endParaRPr lang="en-US"/>
+            <a:endParaRPr lang="en-US" dirty="0"/>
           </a:p>
         </p:txBody>
       </p:sp>
@@ -7042,15 +6975,7 @@
             <a:pPr lvl="1"/>
             <a:r>
               <a:rPr lang="en-US" dirty="0" smtClean="0"/>
-              <a:t>Once a particle enters into a reservoir, a next </a:t>
-            </a:r>
-            <a:r>
-              <a:rPr lang="en-US" dirty="0" err="1" smtClean="0"/>
-              <a:t>waterbody</a:t>
-            </a:r>
-            <a:r>
-              <a:rPr lang="en-US" dirty="0" smtClean="0"/>
-              <a:t> is determined randomly by the ratio of outflows and the volume of the reservoir.</a:t>
+              <a:t>Once a particle enters into a reservoir, a next waterbody is determined randomly by the ratio of outflows and the volume of the reservoir.</a:t>
             </a:r>
             <a:endParaRPr lang="en-US" dirty="0"/>
           </a:p>
@@ -7076,7 +7001,7 @@
               <a:pPr/>
               <a:t>25</a:t>
             </a:fld>
-            <a:endParaRPr lang="en-US"/>
+            <a:endParaRPr lang="en-US" dirty="0"/>
           </a:p>
         </p:txBody>
       </p:sp>
@@ -7175,7 +7100,7 @@
               <a:pPr/>
               <a:t>26</a:t>
             </a:fld>
-            <a:endParaRPr lang="en-US"/>
+            <a:endParaRPr lang="en-US" dirty="0"/>
           </a:p>
         </p:txBody>
       </p:sp>
@@ -7776,7 +7701,7 @@
           <a:bodyPr/>
           <a:lstStyle/>
           <a:p>
-            <a:endParaRPr lang="en-US"/>
+            <a:endParaRPr lang="en-US" dirty="0"/>
           </a:p>
         </p:txBody>
       </p:sp>
@@ -7800,7 +7725,7 @@
               <a:pPr/>
               <a:t>27</a:t>
             </a:fld>
-            <a:endParaRPr lang="en-US"/>
+            <a:endParaRPr lang="en-US" dirty="0"/>
           </a:p>
         </p:txBody>
       </p:sp>
@@ -8028,7 +7953,7 @@
               <a:pPr/>
               <a:t>3</a:t>
             </a:fld>
-            <a:endParaRPr lang="en-US"/>
+            <a:endParaRPr lang="en-US" dirty="0"/>
           </a:p>
         </p:txBody>
       </p:sp>
@@ -8141,7 +8066,7 @@
               <a:buNone/>
               <a:tabLst/>
             </a:pPr>
-            <a:endParaRPr kumimoji="0" lang="en-US" sz="3600" b="1" i="0" u="none" strike="noStrike" cap="none" normalizeH="0" baseline="0" smtClean="0">
+            <a:endParaRPr kumimoji="0" lang="en-US" sz="3600" b="1" i="0" u="none" strike="noStrike" cap="none" normalizeH="0" baseline="0" dirty="0" smtClean="0">
               <a:ln>
                 <a:noFill/>
               </a:ln>
@@ -8204,7 +8129,7 @@
               <a:buNone/>
               <a:tabLst/>
             </a:pPr>
-            <a:endParaRPr kumimoji="0" lang="en-US" sz="3600" b="1" i="0" u="none" strike="noStrike" cap="none" normalizeH="0" baseline="0" smtClean="0">
+            <a:endParaRPr kumimoji="0" lang="en-US" sz="3600" b="1" i="0" u="none" strike="noStrike" cap="none" normalizeH="0" baseline="0" dirty="0" smtClean="0">
               <a:ln>
                 <a:noFill/>
               </a:ln>
@@ -8408,7 +8333,7 @@
               <a:buNone/>
               <a:tabLst/>
             </a:pPr>
-            <a:endParaRPr kumimoji="0" lang="en-US" sz="3600" b="1" i="0" u="none" strike="noStrike" cap="none" normalizeH="0" baseline="0" smtClean="0">
+            <a:endParaRPr kumimoji="0" lang="en-US" sz="3600" b="1" i="0" u="none" strike="noStrike" cap="none" normalizeH="0" baseline="0" dirty="0" smtClean="0">
               <a:ln>
                 <a:noFill/>
               </a:ln>
@@ -8636,7 +8561,7 @@
               <a:buNone/>
               <a:tabLst/>
             </a:pPr>
-            <a:endParaRPr kumimoji="0" lang="en-US" sz="3600" b="1" i="0" u="none" strike="noStrike" cap="none" normalizeH="0" baseline="0" smtClean="0">
+            <a:endParaRPr kumimoji="0" lang="en-US" sz="3600" b="1" i="0" u="none" strike="noStrike" cap="none" normalizeH="0" baseline="0" dirty="0" smtClean="0">
               <a:ln>
                 <a:noFill/>
               </a:ln>
@@ -8944,7 +8869,7 @@
               <a:pPr/>
               <a:t>4</a:t>
             </a:fld>
-            <a:endParaRPr lang="en-US"/>
+            <a:endParaRPr lang="en-US" dirty="0"/>
           </a:p>
         </p:txBody>
       </p:sp>
@@ -9246,7 +9171,7 @@
           <a:lstStyle/>
           <a:p>
             <a:r>
-              <a:rPr lang="en-US" smtClean="0"/>
+              <a:rPr lang="en-US" dirty="0" smtClean="0"/>
               <a:t>Random movement</a:t>
             </a:r>
             <a:endParaRPr lang="en-US" dirty="0"/>
@@ -9273,7 +9198,7 @@
               <a:pPr/>
               <a:t>5</a:t>
             </a:fld>
-            <a:endParaRPr lang="en-US"/>
+            <a:endParaRPr lang="en-US" dirty="0"/>
           </a:p>
         </p:txBody>
       </p:sp>
@@ -9404,7 +9329,7 @@
             <a:bodyPr/>
             <a:lstStyle/>
             <a:p>
-              <a:endParaRPr lang="en-US"/>
+              <a:endParaRPr lang="en-US" dirty="0"/>
             </a:p>
           </p:txBody>
         </p:sp>
@@ -9443,7 +9368,7 @@
             <a:bodyPr/>
             <a:lstStyle/>
             <a:p>
-              <a:endParaRPr lang="en-US"/>
+              <a:endParaRPr lang="en-US" dirty="0"/>
             </a:p>
           </p:txBody>
         </p:sp>
@@ -9482,7 +9407,7 @@
             <a:bodyPr/>
             <a:lstStyle/>
             <a:p>
-              <a:endParaRPr lang="en-US"/>
+              <a:endParaRPr lang="en-US" dirty="0"/>
             </a:p>
           </p:txBody>
         </p:sp>
@@ -9524,7 +9449,7 @@
             <a:bodyPr/>
             <a:lstStyle/>
             <a:p>
-              <a:endParaRPr lang="en-US"/>
+              <a:endParaRPr lang="en-US" dirty="0"/>
             </a:p>
           </p:txBody>
         </p:sp>
@@ -9558,7 +9483,7 @@
             <a:bodyPr/>
             <a:lstStyle/>
             <a:p>
-              <a:endParaRPr lang="en-US"/>
+              <a:endParaRPr lang="en-US" dirty="0"/>
             </a:p>
           </p:txBody>
         </p:sp>
@@ -9628,7 +9553,7 @@
             <a:bodyPr/>
             <a:lstStyle/>
             <a:p>
-              <a:endParaRPr lang="en-US"/>
+              <a:endParaRPr lang="en-US" dirty="0"/>
             </a:p>
           </p:txBody>
         </p:sp>
@@ -9662,7 +9587,7 @@
             <a:bodyPr/>
             <a:lstStyle/>
             <a:p>
-              <a:endParaRPr lang="en-US"/>
+              <a:endParaRPr lang="en-US" dirty="0"/>
             </a:p>
           </p:txBody>
         </p:sp>
@@ -9696,7 +9621,7 @@
             <a:bodyPr/>
             <a:lstStyle/>
             <a:p>
-              <a:endParaRPr lang="en-US"/>
+              <a:endParaRPr lang="en-US" dirty="0"/>
             </a:p>
           </p:txBody>
         </p:sp>
@@ -9730,7 +9655,7 @@
             <a:bodyPr/>
             <a:lstStyle/>
             <a:p>
-              <a:endParaRPr lang="en-US"/>
+              <a:endParaRPr lang="en-US" dirty="0"/>
             </a:p>
           </p:txBody>
         </p:sp>
@@ -9764,7 +9689,7 @@
             <a:bodyPr/>
             <a:lstStyle/>
             <a:p>
-              <a:endParaRPr lang="en-US"/>
+              <a:endParaRPr lang="en-US" dirty="0"/>
             </a:p>
           </p:txBody>
         </p:sp>
@@ -9809,7 +9734,7 @@
             <a:bodyPr/>
             <a:lstStyle/>
             <a:p>
-              <a:endParaRPr lang="en-US"/>
+              <a:endParaRPr lang="en-US" dirty="0"/>
             </a:p>
           </p:txBody>
         </p:sp>
@@ -9843,7 +9768,7 @@
             <a:bodyPr/>
             <a:lstStyle/>
             <a:p>
-              <a:endParaRPr lang="en-US"/>
+              <a:endParaRPr lang="en-US" dirty="0"/>
             </a:p>
           </p:txBody>
         </p:sp>
@@ -9877,7 +9802,7 @@
             <a:bodyPr/>
             <a:lstStyle/>
             <a:p>
-              <a:endParaRPr lang="en-US"/>
+              <a:endParaRPr lang="en-US" dirty="0"/>
             </a:p>
           </p:txBody>
         </p:sp>
@@ -10213,7 +10138,7 @@
               <a:bodyPr/>
               <a:lstStyle/>
               <a:p>
-                <a:endParaRPr lang="en-US"/>
+                <a:endParaRPr lang="en-US" dirty="0"/>
               </a:p>
             </p:txBody>
           </p:sp>
@@ -10247,7 +10172,7 @@
               <a:bodyPr/>
               <a:lstStyle/>
               <a:p>
-                <a:endParaRPr lang="en-US"/>
+                <a:endParaRPr lang="en-US" dirty="0"/>
               </a:p>
             </p:txBody>
           </p:sp>
@@ -10281,7 +10206,7 @@
               <a:bodyPr/>
               <a:lstStyle/>
               <a:p>
-                <a:endParaRPr lang="en-US"/>
+                <a:endParaRPr lang="en-US" dirty="0"/>
               </a:p>
             </p:txBody>
           </p:sp>
@@ -10316,12 +10241,12 @@
               <a:lstStyle/>
               <a:p>
                 <a:r>
-                  <a:rPr lang="en-US" sz="1400" b="0">
+                  <a:rPr lang="en-US" sz="1400" b="0" dirty="0">
                     <a:latin typeface="Times New Roman" pitchFamily="18" charset="0"/>
                   </a:rPr>
                   <a:t>0</a:t>
                 </a:r>
-                <a:endParaRPr lang="en-US"/>
+                <a:endParaRPr lang="en-US" dirty="0"/>
               </a:p>
             </p:txBody>
           </p:sp>
@@ -10355,7 +10280,7 @@
               <a:bodyPr/>
               <a:lstStyle/>
               <a:p>
-                <a:endParaRPr lang="en-US"/>
+                <a:endParaRPr lang="en-US" dirty="0"/>
               </a:p>
             </p:txBody>
           </p:sp>
@@ -10389,7 +10314,7 @@
               <a:bodyPr/>
               <a:lstStyle/>
               <a:p>
-                <a:endParaRPr lang="en-US"/>
+                <a:endParaRPr lang="en-US" dirty="0"/>
               </a:p>
             </p:txBody>
           </p:sp>
@@ -10423,7 +10348,7 @@
               <a:bodyPr/>
               <a:lstStyle/>
               <a:p>
-                <a:endParaRPr lang="en-US"/>
+                <a:endParaRPr lang="en-US" dirty="0"/>
               </a:p>
             </p:txBody>
           </p:sp>
@@ -10511,7 +10436,7 @@
               <a:bodyPr/>
               <a:lstStyle/>
               <a:p>
-                <a:endParaRPr lang="en-US"/>
+                <a:endParaRPr lang="en-US" dirty="0"/>
               </a:p>
             </p:txBody>
           </p:sp>
@@ -10597,7 +10522,7 @@
               <a:bodyPr/>
               <a:lstStyle/>
               <a:p>
-                <a:endParaRPr lang="en-US"/>
+                <a:endParaRPr lang="en-US" dirty="0"/>
               </a:p>
             </p:txBody>
           </p:sp>
@@ -10631,7 +10556,7 @@
               <a:bodyPr/>
               <a:lstStyle/>
               <a:p>
-                <a:endParaRPr lang="en-US"/>
+                <a:endParaRPr lang="en-US" dirty="0"/>
               </a:p>
             </p:txBody>
           </p:sp>
@@ -10719,7 +10644,7 @@
               <a:bodyPr/>
               <a:lstStyle/>
               <a:p>
-                <a:endParaRPr lang="en-US"/>
+                <a:endParaRPr lang="en-US" dirty="0"/>
               </a:p>
             </p:txBody>
           </p:sp>
@@ -10807,7 +10732,7 @@
               <a:bodyPr/>
               <a:lstStyle/>
               <a:p>
-                <a:endParaRPr lang="en-US"/>
+                <a:endParaRPr lang="en-US" dirty="0"/>
               </a:p>
             </p:txBody>
           </p:sp>
@@ -10842,12 +10767,12 @@
               <a:lstStyle/>
               <a:p>
                 <a:r>
-                  <a:rPr lang="en-US" sz="1400" b="0">
+                  <a:rPr lang="en-US" sz="1400" b="0" dirty="0">
                     <a:latin typeface="Symbol" pitchFamily="18" charset="2"/>
                   </a:rPr>
                   <a:t>-</a:t>
                 </a:r>
-                <a:endParaRPr lang="en-US"/>
+                <a:endParaRPr lang="en-US" dirty="0"/>
               </a:p>
             </p:txBody>
           </p:sp>
@@ -10882,12 +10807,12 @@
               <a:lstStyle/>
               <a:p>
                 <a:r>
-                  <a:rPr lang="en-US" sz="1400" b="0">
+                  <a:rPr lang="en-US" sz="1400" b="0" dirty="0">
                     <a:latin typeface="Symbol" pitchFamily="18" charset="2"/>
                   </a:rPr>
                   <a:t>s</a:t>
                 </a:r>
-                <a:endParaRPr lang="en-US"/>
+                <a:endParaRPr lang="en-US" dirty="0"/>
               </a:p>
             </p:txBody>
           </p:sp>
@@ -10922,12 +10847,12 @@
               <a:lstStyle/>
               <a:p>
                 <a:r>
-                  <a:rPr lang="en-US" sz="1400" b="0">
+                  <a:rPr lang="en-US" sz="1400" b="0" dirty="0">
                     <a:latin typeface="Symbol" pitchFamily="18" charset="2"/>
                   </a:rPr>
                   <a:t>s</a:t>
                 </a:r>
-                <a:endParaRPr lang="en-US"/>
+                <a:endParaRPr lang="en-US" dirty="0"/>
               </a:p>
             </p:txBody>
           </p:sp>
@@ -10962,12 +10887,12 @@
               <a:lstStyle/>
               <a:p>
                 <a:r>
-                  <a:rPr lang="en-US" sz="1400" b="0">
+                  <a:rPr lang="en-US" sz="1400" b="0" dirty="0">
                     <a:latin typeface="Times New Roman" pitchFamily="18" charset="0"/>
                   </a:rPr>
                   <a:t>1</a:t>
                 </a:r>
-                <a:endParaRPr lang="en-US"/>
+                <a:endParaRPr lang="en-US" dirty="0"/>
               </a:p>
             </p:txBody>
           </p:sp>
@@ -11002,12 +10927,12 @@
               <a:lstStyle/>
               <a:p>
                 <a:r>
-                  <a:rPr lang="en-US" sz="1400" b="0">
+                  <a:rPr lang="en-US" sz="1400" b="0" dirty="0">
                     <a:latin typeface="Times New Roman" pitchFamily="18" charset="0"/>
                   </a:rPr>
                   <a:t>-</a:t>
                 </a:r>
-                <a:endParaRPr lang="en-US"/>
+                <a:endParaRPr lang="en-US" dirty="0"/>
               </a:p>
             </p:txBody>
           </p:sp>
@@ -11042,12 +10967,12 @@
               <a:lstStyle/>
               <a:p>
                 <a:r>
-                  <a:rPr lang="en-US" sz="1400" b="0">
+                  <a:rPr lang="en-US" sz="1400" b="0" dirty="0">
                     <a:latin typeface="Times New Roman" pitchFamily="18" charset="0"/>
                   </a:rPr>
                   <a:t>1</a:t>
                 </a:r>
-                <a:endParaRPr lang="en-US"/>
+                <a:endParaRPr lang="en-US" dirty="0"/>
               </a:p>
             </p:txBody>
           </p:sp>
@@ -11082,7 +11007,7 @@
             <a:bodyPr/>
             <a:lstStyle/>
             <a:p>
-              <a:endParaRPr lang="en-US"/>
+              <a:endParaRPr lang="en-US" dirty="0"/>
             </a:p>
           </p:txBody>
         </p:sp>
@@ -11156,7 +11081,7 @@
             <a:bodyPr/>
             <a:lstStyle/>
             <a:p>
-              <a:endParaRPr lang="en-US"/>
+              <a:endParaRPr lang="en-US" dirty="0"/>
             </a:p>
           </p:txBody>
         </p:sp>
@@ -11230,7 +11155,7 @@
             <a:bodyPr/>
             <a:lstStyle/>
             <a:p>
-              <a:endParaRPr lang="en-US"/>
+              <a:endParaRPr lang="en-US" dirty="0"/>
             </a:p>
           </p:txBody>
         </p:sp>
@@ -11490,7 +11415,7 @@
             <a:bodyPr/>
             <a:lstStyle/>
             <a:p>
-              <a:endParaRPr lang="en-US"/>
+              <a:endParaRPr lang="en-US" dirty="0"/>
             </a:p>
           </p:txBody>
         </p:sp>
@@ -11750,7 +11675,7 @@
             <a:bodyPr/>
             <a:lstStyle/>
             <a:p>
-              <a:endParaRPr lang="en-US"/>
+              <a:endParaRPr lang="en-US" dirty="0"/>
             </a:p>
           </p:txBody>
         </p:sp>
@@ -11784,7 +11709,7 @@
             <a:bodyPr/>
             <a:lstStyle/>
             <a:p>
-              <a:endParaRPr lang="en-US"/>
+              <a:endParaRPr lang="en-US" dirty="0"/>
             </a:p>
           </p:txBody>
         </p:sp>
@@ -11858,7 +11783,7 @@
             <a:bodyPr/>
             <a:lstStyle/>
             <a:p>
-              <a:endParaRPr lang="en-US"/>
+              <a:endParaRPr lang="en-US" dirty="0"/>
             </a:p>
           </p:txBody>
         </p:sp>
@@ -11932,7 +11857,7 @@
             <a:bodyPr/>
             <a:lstStyle/>
             <a:p>
-              <a:endParaRPr lang="en-US"/>
+              <a:endParaRPr lang="en-US" dirty="0"/>
             </a:p>
           </p:txBody>
         </p:sp>
@@ -12194,7 +12119,7 @@
             <a:bodyPr/>
             <a:lstStyle/>
             <a:p>
-              <a:endParaRPr lang="en-US"/>
+              <a:endParaRPr lang="en-US" dirty="0"/>
             </a:p>
           </p:txBody>
         </p:sp>
@@ -12454,7 +12379,7 @@
             <a:bodyPr/>
             <a:lstStyle/>
             <a:p>
-              <a:endParaRPr lang="en-US"/>
+              <a:endParaRPr lang="en-US" dirty="0"/>
             </a:p>
           </p:txBody>
         </p:sp>
@@ -12488,7 +12413,7 @@
             <a:bodyPr/>
             <a:lstStyle/>
             <a:p>
-              <a:endParaRPr lang="en-US"/>
+              <a:endParaRPr lang="en-US" dirty="0"/>
             </a:p>
           </p:txBody>
         </p:sp>
@@ -12522,7 +12447,7 @@
             <a:bodyPr/>
             <a:lstStyle/>
             <a:p>
-              <a:endParaRPr lang="en-US"/>
+              <a:endParaRPr lang="en-US" dirty="0"/>
             </a:p>
           </p:txBody>
         </p:sp>
@@ -12556,7 +12481,7 @@
             <a:bodyPr/>
             <a:lstStyle/>
             <a:p>
-              <a:endParaRPr lang="en-US"/>
+              <a:endParaRPr lang="en-US" dirty="0"/>
             </a:p>
           </p:txBody>
         </p:sp>
@@ -12590,7 +12515,7 @@
             <a:bodyPr/>
             <a:lstStyle/>
             <a:p>
-              <a:endParaRPr lang="en-US"/>
+              <a:endParaRPr lang="en-US" dirty="0"/>
             </a:p>
           </p:txBody>
         </p:sp>
@@ -12624,7 +12549,7 @@
             <a:bodyPr/>
             <a:lstStyle/>
             <a:p>
-              <a:endParaRPr lang="en-US"/>
+              <a:endParaRPr lang="en-US" dirty="0"/>
             </a:p>
           </p:txBody>
         </p:sp>
@@ -12658,7 +12583,7 @@
             <a:bodyPr/>
             <a:lstStyle/>
             <a:p>
-              <a:endParaRPr lang="en-US"/>
+              <a:endParaRPr lang="en-US" dirty="0"/>
             </a:p>
           </p:txBody>
         </p:sp>
@@ -12693,12 +12618,12 @@
             <a:lstStyle/>
             <a:p>
               <a:r>
-                <a:rPr lang="en-US" sz="1700" b="0">
+                <a:rPr lang="en-US" sz="1700" b="0" dirty="0">
                   <a:latin typeface="Times New Roman" pitchFamily="18" charset="0"/>
                 </a:rPr>
                 <a:t>2</a:t>
               </a:r>
-              <a:endParaRPr lang="en-US"/>
+              <a:endParaRPr lang="en-US" dirty="0"/>
             </a:p>
           </p:txBody>
         </p:sp>
@@ -12733,12 +12658,12 @@
             <a:lstStyle/>
             <a:p>
               <a:r>
-                <a:rPr lang="en-US" sz="1700" b="0">
+                <a:rPr lang="en-US" sz="1700" b="0" dirty="0">
                   <a:latin typeface="Times New Roman" pitchFamily="18" charset="0"/>
                 </a:rPr>
                 <a:t>E</a:t>
               </a:r>
-              <a:endParaRPr lang="en-US"/>
+              <a:endParaRPr lang="en-US" dirty="0"/>
             </a:p>
           </p:txBody>
         </p:sp>
@@ -12773,12 +12698,12 @@
             <a:lstStyle/>
             <a:p>
               <a:r>
-                <a:rPr lang="en-US" sz="1700" b="0">
+                <a:rPr lang="en-US" sz="1700" b="0" dirty="0">
                   <a:latin typeface="Times New Roman" pitchFamily="18" charset="0"/>
                 </a:rPr>
                 <a:t>V</a:t>
               </a:r>
-              <a:endParaRPr lang="en-US"/>
+              <a:endParaRPr lang="en-US" dirty="0"/>
             </a:p>
           </p:txBody>
         </p:sp>
@@ -12813,12 +12738,12 @@
             <a:lstStyle/>
             <a:p>
               <a:r>
-                <a:rPr lang="en-US" sz="1700" b="0">
+                <a:rPr lang="en-US" sz="1700" b="0" dirty="0">
                   <a:latin typeface="Symbol" pitchFamily="18" charset="2"/>
                 </a:rPr>
                 <a:t>D</a:t>
               </a:r>
-              <a:endParaRPr lang="en-US"/>
+              <a:endParaRPr lang="en-US" dirty="0"/>
             </a:p>
           </p:txBody>
         </p:sp>
@@ -12853,12 +12778,12 @@
             <a:lstStyle/>
             <a:p>
               <a:r>
-                <a:rPr lang="en-US" sz="1700" b="0">
+                <a:rPr lang="en-US" sz="1700" b="0" dirty="0">
                   <a:latin typeface="Times New Roman" pitchFamily="18" charset="0"/>
                 </a:rPr>
                 <a:t>t</a:t>
               </a:r>
-              <a:endParaRPr lang="en-US"/>
+              <a:endParaRPr lang="en-US" dirty="0"/>
             </a:p>
           </p:txBody>
         </p:sp>
@@ -12892,7 +12817,7 @@
             <a:bodyPr/>
             <a:lstStyle/>
             <a:p>
-              <a:endParaRPr lang="en-US"/>
+              <a:endParaRPr lang="en-US" dirty="0"/>
             </a:p>
           </p:txBody>
         </p:sp>
@@ -12926,7 +12851,7 @@
             <a:bodyPr/>
             <a:lstStyle/>
             <a:p>
-              <a:endParaRPr lang="en-US"/>
+              <a:endParaRPr lang="en-US" dirty="0"/>
             </a:p>
           </p:txBody>
         </p:sp>
@@ -12960,7 +12885,7 @@
             <a:bodyPr/>
             <a:lstStyle/>
             <a:p>
-              <a:endParaRPr lang="en-US"/>
+              <a:endParaRPr lang="en-US" dirty="0"/>
             </a:p>
           </p:txBody>
         </p:sp>
@@ -12994,7 +12919,7 @@
             <a:bodyPr/>
             <a:lstStyle/>
             <a:p>
-              <a:endParaRPr lang="en-US"/>
+              <a:endParaRPr lang="en-US" dirty="0"/>
             </a:p>
           </p:txBody>
         </p:sp>
@@ -13028,7 +12953,7 @@
             <a:bodyPr/>
             <a:lstStyle/>
             <a:p>
-              <a:endParaRPr lang="en-US"/>
+              <a:endParaRPr lang="en-US" dirty="0"/>
             </a:p>
           </p:txBody>
         </p:sp>
@@ -13062,7 +12987,7 @@
             <a:bodyPr/>
             <a:lstStyle/>
             <a:p>
-              <a:endParaRPr lang="en-US"/>
+              <a:endParaRPr lang="en-US" dirty="0"/>
             </a:p>
           </p:txBody>
         </p:sp>
@@ -13097,12 +13022,12 @@
             <a:lstStyle/>
             <a:p>
               <a:r>
-                <a:rPr lang="en-US" sz="1700" b="0">
+                <a:rPr lang="en-US" sz="1700" b="0" dirty="0">
                   <a:latin typeface="Times New Roman" pitchFamily="18" charset="0"/>
                 </a:rPr>
                 <a:t>2</a:t>
               </a:r>
-              <a:endParaRPr lang="en-US"/>
+              <a:endParaRPr lang="en-US" dirty="0"/>
             </a:p>
           </p:txBody>
         </p:sp>
@@ -13137,12 +13062,12 @@
             <a:lstStyle/>
             <a:p>
               <a:r>
-                <a:rPr lang="en-US" sz="1700" b="0">
+                <a:rPr lang="en-US" sz="1700" b="0" dirty="0">
                   <a:latin typeface="Times New Roman" pitchFamily="18" charset="0"/>
                 </a:rPr>
                 <a:t>E</a:t>
               </a:r>
-              <a:endParaRPr lang="en-US"/>
+              <a:endParaRPr lang="en-US" dirty="0"/>
             </a:p>
           </p:txBody>
         </p:sp>
@@ -13177,12 +13102,12 @@
             <a:lstStyle/>
             <a:p>
               <a:r>
-                <a:rPr lang="en-US" sz="1700" b="0">
+                <a:rPr lang="en-US" sz="1700" b="0" dirty="0">
                   <a:latin typeface="Times New Roman" pitchFamily="18" charset="0"/>
                 </a:rPr>
                 <a:t>T</a:t>
               </a:r>
-              <a:endParaRPr lang="en-US"/>
+              <a:endParaRPr lang="en-US" dirty="0"/>
             </a:p>
           </p:txBody>
         </p:sp>
@@ -13217,12 +13142,12 @@
             <a:lstStyle/>
             <a:p>
               <a:r>
-                <a:rPr lang="en-US" sz="1700" b="0">
+                <a:rPr lang="en-US" sz="1700" b="0" dirty="0">
                   <a:latin typeface="Symbol" pitchFamily="18" charset="2"/>
                 </a:rPr>
                 <a:t>D</a:t>
               </a:r>
-              <a:endParaRPr lang="en-US"/>
+              <a:endParaRPr lang="en-US" dirty="0"/>
             </a:p>
           </p:txBody>
         </p:sp>
@@ -13257,12 +13182,12 @@
             <a:lstStyle/>
             <a:p>
               <a:r>
-                <a:rPr lang="en-US" sz="1700" b="0">
+                <a:rPr lang="en-US" sz="1700" b="0" dirty="0">
                   <a:latin typeface="Times New Roman" pitchFamily="18" charset="0"/>
                 </a:rPr>
                 <a:t>t</a:t>
               </a:r>
-              <a:endParaRPr lang="en-US"/>
+              <a:endParaRPr lang="en-US" dirty="0"/>
             </a:p>
           </p:txBody>
         </p:sp>
@@ -13598,7 +13523,7 @@
               <a:bodyPr/>
               <a:lstStyle/>
               <a:p>
-                <a:endParaRPr lang="en-US"/>
+                <a:endParaRPr lang="en-US" dirty="0"/>
               </a:p>
             </p:txBody>
           </p:sp>
@@ -13632,7 +13557,7 @@
               <a:bodyPr/>
               <a:lstStyle/>
               <a:p>
-                <a:endParaRPr lang="en-US"/>
+                <a:endParaRPr lang="en-US" dirty="0"/>
               </a:p>
             </p:txBody>
           </p:sp>
@@ -13666,7 +13591,7 @@
               <a:bodyPr/>
               <a:lstStyle/>
               <a:p>
-                <a:endParaRPr lang="en-US"/>
+                <a:endParaRPr lang="en-US" dirty="0"/>
               </a:p>
             </p:txBody>
           </p:sp>
@@ -13701,12 +13626,12 @@
               <a:lstStyle/>
               <a:p>
                 <a:r>
-                  <a:rPr lang="en-US" sz="1400" b="0">
+                  <a:rPr lang="en-US" sz="1400" b="0" dirty="0">
                     <a:latin typeface="Times New Roman" pitchFamily="18" charset="0"/>
                   </a:rPr>
                   <a:t>0</a:t>
                 </a:r>
-                <a:endParaRPr lang="en-US"/>
+                <a:endParaRPr lang="en-US" dirty="0"/>
               </a:p>
             </p:txBody>
           </p:sp>
@@ -13740,7 +13665,7 @@
               <a:bodyPr/>
               <a:lstStyle/>
               <a:p>
-                <a:endParaRPr lang="en-US"/>
+                <a:endParaRPr lang="en-US" dirty="0"/>
               </a:p>
             </p:txBody>
           </p:sp>
@@ -13774,7 +13699,7 @@
               <a:bodyPr/>
               <a:lstStyle/>
               <a:p>
-                <a:endParaRPr lang="en-US"/>
+                <a:endParaRPr lang="en-US" dirty="0"/>
               </a:p>
             </p:txBody>
           </p:sp>
@@ -13808,7 +13733,7 @@
               <a:bodyPr/>
               <a:lstStyle/>
               <a:p>
-                <a:endParaRPr lang="en-US"/>
+                <a:endParaRPr lang="en-US" dirty="0"/>
               </a:p>
             </p:txBody>
           </p:sp>
@@ -13896,7 +13821,7 @@
               <a:bodyPr/>
               <a:lstStyle/>
               <a:p>
-                <a:endParaRPr lang="en-US"/>
+                <a:endParaRPr lang="en-US" dirty="0"/>
               </a:p>
             </p:txBody>
           </p:sp>
@@ -13982,7 +13907,7 @@
               <a:bodyPr/>
               <a:lstStyle/>
               <a:p>
-                <a:endParaRPr lang="en-US"/>
+                <a:endParaRPr lang="en-US" dirty="0"/>
               </a:p>
             </p:txBody>
           </p:sp>
@@ -14016,7 +13941,7 @@
               <a:bodyPr/>
               <a:lstStyle/>
               <a:p>
-                <a:endParaRPr lang="en-US"/>
+                <a:endParaRPr lang="en-US" dirty="0"/>
               </a:p>
             </p:txBody>
           </p:sp>
@@ -14104,7 +14029,7 @@
               <a:bodyPr/>
               <a:lstStyle/>
               <a:p>
-                <a:endParaRPr lang="en-US"/>
+                <a:endParaRPr lang="en-US" dirty="0"/>
               </a:p>
             </p:txBody>
           </p:sp>
@@ -14192,7 +14117,7 @@
               <a:bodyPr/>
               <a:lstStyle/>
               <a:p>
-                <a:endParaRPr lang="en-US"/>
+                <a:endParaRPr lang="en-US" dirty="0"/>
               </a:p>
             </p:txBody>
           </p:sp>
@@ -14227,12 +14152,12 @@
               <a:lstStyle/>
               <a:p>
                 <a:r>
-                  <a:rPr lang="en-US" sz="1400" b="0">
+                  <a:rPr lang="en-US" sz="1400" b="0" dirty="0">
                     <a:latin typeface="Symbol" pitchFamily="18" charset="2"/>
                   </a:rPr>
                   <a:t>-</a:t>
                 </a:r>
-                <a:endParaRPr lang="en-US"/>
+                <a:endParaRPr lang="en-US" dirty="0"/>
               </a:p>
             </p:txBody>
           </p:sp>
@@ -14267,12 +14192,12 @@
               <a:lstStyle/>
               <a:p>
                 <a:r>
-                  <a:rPr lang="en-US" sz="1400" b="0">
+                  <a:rPr lang="en-US" sz="1400" b="0" dirty="0">
                     <a:latin typeface="Symbol" pitchFamily="18" charset="2"/>
                   </a:rPr>
                   <a:t>s</a:t>
                 </a:r>
-                <a:endParaRPr lang="en-US"/>
+                <a:endParaRPr lang="en-US" dirty="0"/>
               </a:p>
             </p:txBody>
           </p:sp>
@@ -14307,12 +14232,12 @@
               <a:lstStyle/>
               <a:p>
                 <a:r>
-                  <a:rPr lang="en-US" sz="1400" b="0">
+                  <a:rPr lang="en-US" sz="1400" b="0" dirty="0">
                     <a:latin typeface="Symbol" pitchFamily="18" charset="2"/>
                   </a:rPr>
                   <a:t>s</a:t>
                 </a:r>
-                <a:endParaRPr lang="en-US"/>
+                <a:endParaRPr lang="en-US" dirty="0"/>
               </a:p>
             </p:txBody>
           </p:sp>
@@ -14347,12 +14272,12 @@
               <a:lstStyle/>
               <a:p>
                 <a:r>
-                  <a:rPr lang="en-US" sz="1400" b="0">
+                  <a:rPr lang="en-US" sz="1400" b="0" dirty="0">
                     <a:latin typeface="Times New Roman" pitchFamily="18" charset="0"/>
                   </a:rPr>
                   <a:t>1</a:t>
                 </a:r>
-                <a:endParaRPr lang="en-US"/>
+                <a:endParaRPr lang="en-US" dirty="0"/>
               </a:p>
             </p:txBody>
           </p:sp>
@@ -14387,12 +14312,12 @@
               <a:lstStyle/>
               <a:p>
                 <a:r>
-                  <a:rPr lang="en-US" sz="1400" b="0">
+                  <a:rPr lang="en-US" sz="1400" b="0" dirty="0">
                     <a:latin typeface="Times New Roman" pitchFamily="18" charset="0"/>
                   </a:rPr>
                   <a:t>-</a:t>
                 </a:r>
-                <a:endParaRPr lang="en-US"/>
+                <a:endParaRPr lang="en-US" dirty="0"/>
               </a:p>
             </p:txBody>
           </p:sp>
@@ -14427,12 +14352,12 @@
               <a:lstStyle/>
               <a:p>
                 <a:r>
-                  <a:rPr lang="en-US" sz="1400" b="0">
+                  <a:rPr lang="en-US" sz="1400" b="0" dirty="0">
                     <a:latin typeface="Times New Roman" pitchFamily="18" charset="0"/>
                   </a:rPr>
                   <a:t>1</a:t>
                 </a:r>
-                <a:endParaRPr lang="en-US"/>
+                <a:endParaRPr lang="en-US" dirty="0"/>
               </a:p>
             </p:txBody>
           </p:sp>
@@ -14533,7 +14458,7 @@
               <a:pPr/>
               <a:t>6</a:t>
             </a:fld>
-            <a:endParaRPr lang="en-US"/>
+            <a:endParaRPr lang="en-US" dirty="0"/>
           </a:p>
         </p:txBody>
       </p:sp>
@@ -15069,22 +14994,14 @@
           <a:p>
             <a:r>
               <a:rPr lang="en-US" sz="2800" dirty="0" smtClean="0"/>
-              <a:t>Particle in a region</a:t>
+              <a:t>Particles in a region</a:t>
             </a:r>
           </a:p>
           <a:p>
             <a:pPr lvl="1"/>
             <a:r>
               <a:rPr lang="en-US" sz="2000" dirty="0" smtClean="0"/>
-              <a:t>Form a group of </a:t>
-            </a:r>
-            <a:r>
-              <a:rPr lang="en-US" sz="2000" dirty="0" err="1" smtClean="0"/>
-              <a:t>waterbodies</a:t>
-            </a:r>
-            <a:r>
-              <a:rPr lang="en-US" sz="2000" dirty="0" smtClean="0"/>
-              <a:t> using regular expressions</a:t>
+              <a:t>Form a group of waterbodies using regular expressions</a:t>
             </a:r>
           </a:p>
           <a:p>
@@ -15097,15 +15014,7 @@
             <a:pPr lvl="1"/>
             <a:r>
               <a:rPr lang="en-US" sz="2000" dirty="0" smtClean="0"/>
-              <a:t>From a group of </a:t>
-            </a:r>
-            <a:r>
-              <a:rPr lang="en-US" sz="2000" dirty="0" err="1" smtClean="0"/>
-              <a:t>waterbedies</a:t>
-            </a:r>
-            <a:r>
-              <a:rPr lang="en-US" sz="2000" dirty="0" smtClean="0"/>
-              <a:t> to another</a:t>
+              <a:t>From a group of waterbodies to another</a:t>
             </a:r>
           </a:p>
           <a:p>
@@ -15151,7 +15060,7 @@
               <a:pPr/>
               <a:t>7</a:t>
             </a:fld>
-            <a:endParaRPr lang="en-US"/>
+            <a:endParaRPr lang="en-US" dirty="0"/>
           </a:p>
         </p:txBody>
       </p:sp>
@@ -15383,7 +15292,7 @@
               <a:buNone/>
               <a:tabLst/>
             </a:pPr>
-            <a:endParaRPr kumimoji="0" lang="en-US" sz="3600" b="1" i="0" u="none" strike="noStrike" cap="none" normalizeH="0" baseline="0" smtClean="0">
+            <a:endParaRPr kumimoji="0" lang="en-US" sz="3600" b="1" i="0" u="none" strike="noStrike" cap="none" normalizeH="0" baseline="0" dirty="0" smtClean="0">
               <a:ln>
                 <a:noFill/>
               </a:ln>
@@ -15450,7 +15359,7 @@
               <a:buNone/>
               <a:tabLst/>
             </a:pPr>
-            <a:endParaRPr kumimoji="0" lang="en-US" sz="3600" b="1" i="0" u="none" strike="noStrike" cap="none" normalizeH="0" baseline="0" smtClean="0">
+            <a:endParaRPr kumimoji="0" lang="en-US" sz="3600" b="1" i="0" u="none" strike="noStrike" cap="none" normalizeH="0" baseline="0" dirty="0" smtClean="0">
               <a:ln>
                 <a:noFill/>
               </a:ln>
@@ -15517,7 +15426,7 @@
               <a:buNone/>
               <a:tabLst/>
             </a:pPr>
-            <a:endParaRPr kumimoji="0" lang="en-US" sz="3600" b="1" i="0" u="none" strike="noStrike" cap="none" normalizeH="0" baseline="0" smtClean="0">
+            <a:endParaRPr kumimoji="0" lang="en-US" sz="3600" b="1" i="0" u="none" strike="noStrike" cap="none" normalizeH="0" baseline="0" dirty="0" smtClean="0">
               <a:ln>
                 <a:noFill/>
               </a:ln>
@@ -15584,7 +15493,7 @@
               <a:buNone/>
               <a:tabLst/>
             </a:pPr>
-            <a:endParaRPr kumimoji="0" lang="en-US" sz="3600" b="1" i="0" u="none" strike="noStrike" cap="none" normalizeH="0" baseline="0" smtClean="0">
+            <a:endParaRPr kumimoji="0" lang="en-US" sz="3600" b="1" i="0" u="none" strike="noStrike" cap="none" normalizeH="0" baseline="0" dirty="0" smtClean="0">
               <a:ln>
                 <a:noFill/>
               </a:ln>
@@ -15651,7 +15560,7 @@
               <a:buNone/>
               <a:tabLst/>
             </a:pPr>
-            <a:endParaRPr kumimoji="0" lang="en-US" sz="3600" b="1" i="0" u="none" strike="noStrike" cap="none" normalizeH="0" baseline="0" smtClean="0">
+            <a:endParaRPr kumimoji="0" lang="en-US" sz="3600" b="1" i="0" u="none" strike="noStrike" cap="none" normalizeH="0" baseline="0" dirty="0" smtClean="0">
               <a:ln>
                 <a:noFill/>
               </a:ln>
@@ -15718,7 +15627,7 @@
               <a:buNone/>
               <a:tabLst/>
             </a:pPr>
-            <a:endParaRPr kumimoji="0" lang="en-US" sz="3600" b="1" i="0" u="none" strike="noStrike" cap="none" normalizeH="0" baseline="0" smtClean="0">
+            <a:endParaRPr kumimoji="0" lang="en-US" sz="3600" b="1" i="0" u="none" strike="noStrike" cap="none" normalizeH="0" baseline="0" dirty="0" smtClean="0">
               <a:ln>
                 <a:noFill/>
               </a:ln>
@@ -15785,7 +15694,7 @@
               <a:buNone/>
               <a:tabLst/>
             </a:pPr>
-            <a:endParaRPr kumimoji="0" lang="en-US" sz="3600" b="1" i="0" u="none" strike="noStrike" cap="none" normalizeH="0" baseline="0" smtClean="0">
+            <a:endParaRPr kumimoji="0" lang="en-US" sz="3600" b="1" i="0" u="none" strike="noStrike" cap="none" normalizeH="0" baseline="0" dirty="0" smtClean="0">
               <a:ln>
                 <a:noFill/>
               </a:ln>
@@ -15877,7 +15786,7 @@
               <a:buNone/>
               <a:tabLst/>
             </a:pPr>
-            <a:endParaRPr kumimoji="0" lang="en-US" sz="3600" b="1" i="0" u="none" strike="noStrike" cap="none" normalizeH="0" baseline="0" smtClean="0">
+            <a:endParaRPr kumimoji="0" lang="en-US" sz="3600" b="1" i="0" u="none" strike="noStrike" cap="none" normalizeH="0" baseline="0" dirty="0" smtClean="0">
               <a:ln>
                 <a:noFill/>
               </a:ln>
@@ -16318,7 +16227,7 @@
               <a:pPr/>
               <a:t>8</a:t>
             </a:fld>
-            <a:endParaRPr lang="en-US"/>
+            <a:endParaRPr lang="en-US" dirty="0"/>
           </a:p>
         </p:txBody>
       </p:sp>
@@ -16401,13 +16310,13 @@
           <a:p>
             <a:r>
               <a:rPr lang="en-US" dirty="0" smtClean="0"/>
+              <a:t>Grid information from a tide file</a:t>
+            </a:r>
+          </a:p>
+          <a:p>
+            <a:r>
+              <a:rPr lang="en-US" dirty="0" smtClean="0"/>
               <a:t>Slight changes in the input file</a:t>
-            </a:r>
-          </a:p>
-          <a:p>
-            <a:r>
-              <a:rPr lang="en-US" dirty="0" smtClean="0"/>
-              <a:t>Grid information from a tide file</a:t>
             </a:r>
           </a:p>
           <a:p>
@@ -16438,7 +16347,7 @@
               <a:pPr/>
               <a:t>9</a:t>
             </a:fld>
-            <a:endParaRPr lang="en-US"/>
+            <a:endParaRPr lang="en-US" dirty="0"/>
           </a:p>
         </p:txBody>
       </p:sp>

</xml_diff>

<commit_message>
Another minor change in the PTM slides.
git-svn-id: http://dminfo:8686/svn/repository/models/branches/dsm2_distribute_v8_0@1637 cdc4813b-4270-ec4f-936e-925f93a782c2

Former-commit-id: c3a09ce6c01ef99c9a8728287081d833829b6f4f
</commit_message>
<xml_diff>
--- a/dsm2/presentations/d2_ptm.pptx
+++ b/dsm2/presentations/d2_ptm.pptx
@@ -3668,15 +3668,7 @@
           <a:p>
             <a:r>
               <a:rPr lang="en-US" dirty="0" smtClean="0"/>
-              <a:t>September </a:t>
-            </a:r>
-            <a:r>
-              <a:rPr lang="en-US" dirty="0" smtClean="0"/>
-              <a:t>21,22, and 24, </a:t>
-            </a:r>
-            <a:r>
-              <a:rPr lang="en-US" dirty="0" smtClean="0"/>
-              <a:t>2009</a:t>
+              <a:t>September 21,22, and 24, 2009</a:t>
             </a:r>
             <a:endParaRPr lang="en-US" dirty="0"/>
           </a:p>
@@ -3852,14 +3844,27 @@
           <a:p>
             <a:r>
               <a:rPr lang="en-US" sz="2500" dirty="0" smtClean="0"/>
-              <a:t>Do not use a group name ‘all’ to define a new group.  It is a reserved already.</a:t>
-            </a:r>
-          </a:p>
-          <a:p>
+              <a:t>Do not use a group name ‘all’ to define a new group.  It is </a:t>
+            </a:r>
             <a:r>
               <a:rPr lang="en-US" sz="2500" dirty="0" smtClean="0"/>
-              <a:t>Limitations in the numbers of groups and outputs.</a:t>
-            </a:r>
+              <a:t>reserved </a:t>
+            </a:r>
+            <a:r>
+              <a:rPr lang="en-US" sz="2500" dirty="0" smtClean="0"/>
+              <a:t>already.</a:t>
+            </a:r>
+          </a:p>
+          <a:p>
+            <a:r>
+              <a:rPr lang="en-US" sz="2500" dirty="0" smtClean="0"/>
+              <a:t>Limitations in the numbers of groups and </a:t>
+            </a:r>
+            <a:r>
+              <a:rPr lang="en-US" sz="2500" dirty="0" smtClean="0"/>
+              <a:t>outputs</a:t>
+            </a:r>
+            <a:endParaRPr lang="en-US" sz="2500" dirty="0" smtClean="0"/>
           </a:p>
           <a:p>
             <a:r>
@@ -4275,21 +4280,22 @@
           <a:p>
             <a:r>
               <a:rPr lang="en-US" dirty="0" smtClean="0"/>
-              <a:t>Particles are injected at Mossdale (Node 7) continuously.</a:t>
-            </a:r>
-          </a:p>
-          <a:p>
+              <a:t>Particles are injected at Mossdale (Node 7) </a:t>
+            </a:r>
             <a:r>
               <a:rPr lang="en-US" dirty="0" smtClean="0"/>
-              <a:t>Outputs are in-delta particles and accumulated </a:t>
+              <a:t>continuously for </a:t>
             </a:r>
             <a:r>
               <a:rPr lang="en-US" smtClean="0"/>
-              <a:t>particle fluxes </a:t>
-            </a:r>
+              <a:t>a day.</a:t>
+            </a:r>
+            <a:endParaRPr lang="en-US" dirty="0" smtClean="0"/>
+          </a:p>
+          <a:p>
             <a:r>
               <a:rPr lang="en-US" dirty="0" smtClean="0"/>
-              <a:t>at the exports and Martinez downstream boundary.</a:t>
+              <a:t>Outputs are in-delta particles and accumulated particle fluxes at the exports and Martinez downstream boundary.</a:t>
             </a:r>
             <a:endParaRPr lang="en-US" dirty="0"/>
           </a:p>
@@ -14753,9 +14759,10 @@
           <a:p>
             <a:pPr eaLnBrk="1" hangingPunct="1"/>
             <a:r>
-              <a:rPr lang="en-US" sz="2400" dirty="0"/>
-              <a:t>Information</a:t>
-            </a:r>
+              <a:rPr lang="en-US" sz="2400" dirty="0" smtClean="0"/>
+              <a:t>Results</a:t>
+            </a:r>
+            <a:endParaRPr lang="en-US" sz="2400" dirty="0"/>
           </a:p>
         </p:txBody>
       </p:sp>

</xml_diff>